<commit_message>
added citation, moved down sources
</commit_message>
<xml_diff>
--- a/images/poster/Wikipedia_poster.pptx
+++ b/images/poster/Wikipedia_poster.pptx
@@ -331,7 +331,7 @@
               <a:pPr>
                 <a:defRPr/>
               </a:pPr>
-              <a:t>12/7/2018</a:t>
+              <a:t>12/7/18</a:t>
             </a:fld>
             <a:endParaRPr lang="en-US" altLang="en-US"/>
           </a:p>
@@ -561,7 +561,7 @@
               <a:pPr>
                 <a:defRPr/>
               </a:pPr>
-              <a:t>12/7/2018</a:t>
+              <a:t>12/7/18</a:t>
             </a:fld>
             <a:endParaRPr lang="en-US" altLang="en-US"/>
           </a:p>
@@ -1218,7 +1218,7 @@
               <a:pPr>
                 <a:defRPr/>
               </a:pPr>
-              <a:t>12/7/2018</a:t>
+              <a:t>12/7/18</a:t>
             </a:fld>
             <a:endParaRPr lang="en-US" altLang="en-US"/>
           </a:p>
@@ -1431,7 +1431,7 @@
               <a:pPr>
                 <a:defRPr/>
               </a:pPr>
-              <a:t>12/7/2018</a:t>
+              <a:t>12/7/18</a:t>
             </a:fld>
             <a:endParaRPr lang="en-US" altLang="en-US"/>
           </a:p>
@@ -1654,7 +1654,7 @@
               <a:pPr>
                 <a:defRPr/>
               </a:pPr>
-              <a:t>12/7/2018</a:t>
+              <a:t>12/7/18</a:t>
             </a:fld>
             <a:endParaRPr lang="en-US" altLang="en-US"/>
           </a:p>
@@ -1867,7 +1867,7 @@
               <a:pPr>
                 <a:defRPr/>
               </a:pPr>
-              <a:t>12/7/2018</a:t>
+              <a:t>12/7/18</a:t>
             </a:fld>
             <a:endParaRPr lang="en-US" altLang="en-US"/>
           </a:p>
@@ -2157,7 +2157,7 @@
               <a:pPr>
                 <a:defRPr/>
               </a:pPr>
-              <a:t>12/7/2018</a:t>
+              <a:t>12/7/18</a:t>
             </a:fld>
             <a:endParaRPr lang="en-US" altLang="en-US"/>
           </a:p>
@@ -2487,7 +2487,7 @@
               <a:pPr>
                 <a:defRPr/>
               </a:pPr>
-              <a:t>12/7/2018</a:t>
+              <a:t>12/7/18</a:t>
             </a:fld>
             <a:endParaRPr lang="en-US" altLang="en-US"/>
           </a:p>
@@ -2951,7 +2951,7 @@
               <a:pPr>
                 <a:defRPr/>
               </a:pPr>
-              <a:t>12/7/2018</a:t>
+              <a:t>12/7/18</a:t>
             </a:fld>
             <a:endParaRPr lang="en-US" altLang="en-US"/>
           </a:p>
@@ -3113,7 +3113,7 @@
               <a:pPr>
                 <a:defRPr/>
               </a:pPr>
-              <a:t>12/7/2018</a:t>
+              <a:t>12/7/18</a:t>
             </a:fld>
             <a:endParaRPr lang="en-US" altLang="en-US"/>
           </a:p>
@@ -3253,7 +3253,7 @@
               <a:pPr>
                 <a:defRPr/>
               </a:pPr>
-              <a:t>12/7/2018</a:t>
+              <a:t>12/7/18</a:t>
             </a:fld>
             <a:endParaRPr lang="en-US" altLang="en-US"/>
           </a:p>
@@ -3573,7 +3573,7 @@
               <a:pPr>
                 <a:defRPr/>
               </a:pPr>
-              <a:t>12/7/2018</a:t>
+              <a:t>12/7/18</a:t>
             </a:fld>
             <a:endParaRPr lang="en-US" altLang="en-US"/>
           </a:p>
@@ -3873,7 +3873,7 @@
               <a:pPr>
                 <a:defRPr/>
               </a:pPr>
-              <a:t>12/7/2018</a:t>
+              <a:t>12/7/18</a:t>
             </a:fld>
             <a:endParaRPr lang="en-US" altLang="en-US"/>
           </a:p>
@@ -4193,7 +4193,7 @@
               <a:pPr>
                 <a:defRPr/>
               </a:pPr>
-              <a:t>12/7/2018</a:t>
+              <a:t>12/7/18</a:t>
             </a:fld>
             <a:endParaRPr lang="en-US" altLang="en-US"/>
           </a:p>
@@ -6150,7 +6150,7 @@
         </p:nvSpPr>
         <p:spPr bwMode="auto">
           <a:xfrm>
-            <a:off x="19413538" y="33183513"/>
+            <a:off x="19413538" y="33676050"/>
             <a:ext cx="8013700" cy="2211387"/>
           </a:xfrm>
           <a:prstGeom prst="rect">
@@ -7786,8 +7786,8 @@
         </p:nvSpPr>
         <p:spPr bwMode="auto">
           <a:xfrm>
-            <a:off x="1147763" y="38157150"/>
-            <a:ext cx="25995312" cy="715963"/>
+            <a:off x="19404013" y="35955165"/>
+            <a:ext cx="5101907" cy="300846"/>
           </a:xfrm>
           <a:prstGeom prst="rect">
             <a:avLst/>
@@ -7817,7 +7817,7 @@
           </a:extLst>
         </p:spPr>
         <p:txBody>
-          <a:bodyPr lIns="84576" tIns="42288" rIns="84576" bIns="42288">
+          <a:bodyPr wrap="square" lIns="84576" tIns="42288" rIns="84576" bIns="42288">
             <a:spAutoFit/>
           </a:bodyPr>
           <a:lstStyle>
@@ -7961,7 +7961,7 @@
             </a:lvl9pPr>
           </a:lstStyle>
           <a:p>
-            <a:pPr algn="ctr" eaLnBrk="1" hangingPunct="1">
+            <a:pPr eaLnBrk="1" hangingPunct="1">
               <a:spcBef>
                 <a:spcPct val="0"/>
               </a:spcBef>
@@ -7969,12 +7969,23 @@
               <a:buNone/>
             </a:pPr>
             <a:r>
-              <a:rPr lang="en-US" altLang="en-US" sz="4100">
-                <a:latin typeface="Helvetica" panose="020B0604020202020204" pitchFamily="34" charset="0"/>
+              <a:rPr lang="en-US" sz="1400" dirty="0" err="1">
+                <a:latin typeface="Courier New" panose="02070309020205020404" pitchFamily="49" charset="0"/>
+                <a:cs typeface="Courier New" panose="02070309020205020404" pitchFamily="49" charset="0"/>
               </a:rPr>
-              <a:t>John A. Paulson School of Engineering and Applied Sciences</a:t>
-            </a:r>
-            <a:endParaRPr lang="en-US" altLang="en-US" sz="7600"/>
+              <a:t>code.google.com</a:t>
+            </a:r>
+            <a:r>
+              <a:rPr lang="en-US" sz="1400" dirty="0">
+                <a:latin typeface="Courier New" panose="02070309020205020404" pitchFamily="49" charset="0"/>
+                <a:cs typeface="Courier New" panose="02070309020205020404" pitchFamily="49" charset="0"/>
+              </a:rPr>
+              <a:t>/p/word2vec/source/</a:t>
+            </a:r>
+            <a:endParaRPr lang="en-US" altLang="en-US" sz="1400" dirty="0">
+              <a:latin typeface="Courier New" panose="02070309020205020404" pitchFamily="49" charset="0"/>
+              <a:cs typeface="Courier New" panose="02070309020205020404" pitchFamily="49" charset="0"/>
+            </a:endParaRPr>
           </a:p>
         </p:txBody>
       </p:sp>
@@ -9655,7 +9666,7 @@
         </p:blipFill>
         <p:spPr bwMode="auto">
           <a:xfrm>
-            <a:off x="19413538" y="35717163"/>
+            <a:off x="19413538" y="36434332"/>
             <a:ext cx="8177212" cy="628650"/>
           </a:xfrm>
           <a:prstGeom prst="rect">
@@ -9715,7 +9726,7 @@
         </p:blipFill>
         <p:spPr bwMode="auto">
           <a:xfrm>
-            <a:off x="19413538" y="36412488"/>
+            <a:off x="19413538" y="37162996"/>
             <a:ext cx="8255000" cy="893762"/>
           </a:xfrm>
           <a:prstGeom prst="rect">

</xml_diff>

<commit_message>
add k means heuristic notebook
</commit_message>
<xml_diff>
--- a/images/poster/Wikipedia_poster.pptx
+++ b/images/poster/Wikipedia_poster.pptx
@@ -6357,7 +6357,7 @@
         <p:spPr bwMode="auto">
           <a:xfrm>
             <a:off x="19323050" y="23831550"/>
-            <a:ext cx="8253413" cy="9780364"/>
+            <a:ext cx="8253413" cy="9318699"/>
           </a:xfrm>
           <a:prstGeom prst="rect">
             <a:avLst/>
@@ -6556,7 +6556,7 @@
               <a:buFontTx/>
               <a:buNone/>
             </a:pPr>
-            <a:endParaRPr lang="en-US" altLang="en-US" sz="3000">
+            <a:endParaRPr lang="en-US" altLang="en-US" sz="3000" dirty="0">
               <a:latin typeface="Times" panose="02020603050405020304" pitchFamily="18" charset="0"/>
             </a:endParaRPr>
           </a:p>
@@ -6587,7 +6587,7 @@
               <a:buFontTx/>
               <a:buNone/>
             </a:pPr>
-            <a:endParaRPr lang="en-US" altLang="en-US" sz="3000">
+            <a:endParaRPr lang="en-US" altLang="en-US" sz="3000" dirty="0">
               <a:latin typeface="Times" panose="02020603050405020304" pitchFamily="18" charset="0"/>
             </a:endParaRPr>
           </a:p>
@@ -6602,7 +6602,19 @@
               <a:rPr lang="en-US" altLang="en-US" sz="3000" dirty="0">
                 <a:latin typeface="Times" panose="02020603050405020304" pitchFamily="18" charset="0"/>
               </a:rPr>
-              <a:t>Next, we will focus on implementing A* and developing a consistent, admissible, and effective heuristic. Given that failed searches are more likely than previously believed, we will place greater emphasis on improving success rates moving forward. </a:t>
+              <a:t>Next, we will focus on implementing A* and developing </a:t>
+            </a:r>
+            <a:r>
+              <a:rPr lang="en-US" altLang="en-US" sz="3000">
+                <a:latin typeface="Times" panose="02020603050405020304" pitchFamily="18" charset="0"/>
+              </a:rPr>
+              <a:t>a admissible</a:t>
+            </a:r>
+            <a:r>
+              <a:rPr lang="en-US" altLang="en-US" sz="3000" dirty="0">
+                <a:latin typeface="Times" panose="02020603050405020304" pitchFamily="18" charset="0"/>
+              </a:rPr>
+              <a:t>, and effective heuristic. Given that failed searches are more likely than previously believed, we will place greater emphasis on improving success rates moving forward. </a:t>
             </a:r>
             <a:endParaRPr lang="en-US" altLang="en-US" sz="3000" dirty="0">
               <a:latin typeface="Times" panose="02020603050405020304" pitchFamily="18" charset="0"/>

</xml_diff>